<commit_message>
Update site (requested push)
</commit_message>
<xml_diff>
--- a/Conditions.pptx
+++ b/Conditions.pptx
@@ -104,6 +104,11 @@
       </a:defRPr>
     </a:lvl9pPr>
   </p:defaultTextStyle>
+  <p:extLst>
+    <p:ext uri="{EFAFB233-063F-42B5-8137-9DF3F51BA10A}">
+      <p15:sldGuideLst xmlns:p15="http://schemas.microsoft.com/office/powerpoint/2012/main"/>
+    </p:ext>
+  </p:extLst>
 </p:presentation>
 </file>
 
@@ -256,7 +261,7 @@
           <a:p>
             <a:fld id="{55825D43-8A3F-8143-9013-070E6CFB6FCE}" type="datetimeFigureOut">
               <a:rPr lang="en-DE" smtClean="0"/>
-              <a:t>23.10.25</a:t>
+              <a:t>29.10.25</a:t>
             </a:fld>
             <a:endParaRPr lang="en-DE"/>
           </a:p>
@@ -456,7 +461,7 @@
           <a:p>
             <a:fld id="{55825D43-8A3F-8143-9013-070E6CFB6FCE}" type="datetimeFigureOut">
               <a:rPr lang="en-DE" smtClean="0"/>
-              <a:t>23.10.25</a:t>
+              <a:t>29.10.25</a:t>
             </a:fld>
             <a:endParaRPr lang="en-DE"/>
           </a:p>
@@ -666,7 +671,7 @@
           <a:p>
             <a:fld id="{55825D43-8A3F-8143-9013-070E6CFB6FCE}" type="datetimeFigureOut">
               <a:rPr lang="en-DE" smtClean="0"/>
-              <a:t>23.10.25</a:t>
+              <a:t>29.10.25</a:t>
             </a:fld>
             <a:endParaRPr lang="en-DE"/>
           </a:p>
@@ -866,7 +871,7 @@
           <a:p>
             <a:fld id="{55825D43-8A3F-8143-9013-070E6CFB6FCE}" type="datetimeFigureOut">
               <a:rPr lang="en-DE" smtClean="0"/>
-              <a:t>23.10.25</a:t>
+              <a:t>29.10.25</a:t>
             </a:fld>
             <a:endParaRPr lang="en-DE"/>
           </a:p>
@@ -1142,7 +1147,7 @@
           <a:p>
             <a:fld id="{55825D43-8A3F-8143-9013-070E6CFB6FCE}" type="datetimeFigureOut">
               <a:rPr lang="en-DE" smtClean="0"/>
-              <a:t>23.10.25</a:t>
+              <a:t>29.10.25</a:t>
             </a:fld>
             <a:endParaRPr lang="en-DE"/>
           </a:p>
@@ -1410,7 +1415,7 @@
           <a:p>
             <a:fld id="{55825D43-8A3F-8143-9013-070E6CFB6FCE}" type="datetimeFigureOut">
               <a:rPr lang="en-DE" smtClean="0"/>
-              <a:t>23.10.25</a:t>
+              <a:t>29.10.25</a:t>
             </a:fld>
             <a:endParaRPr lang="en-DE"/>
           </a:p>
@@ -1825,7 +1830,7 @@
           <a:p>
             <a:fld id="{55825D43-8A3F-8143-9013-070E6CFB6FCE}" type="datetimeFigureOut">
               <a:rPr lang="en-DE" smtClean="0"/>
-              <a:t>23.10.25</a:t>
+              <a:t>29.10.25</a:t>
             </a:fld>
             <a:endParaRPr lang="en-DE"/>
           </a:p>
@@ -1967,7 +1972,7 @@
           <a:p>
             <a:fld id="{55825D43-8A3F-8143-9013-070E6CFB6FCE}" type="datetimeFigureOut">
               <a:rPr lang="en-DE" smtClean="0"/>
-              <a:t>23.10.25</a:t>
+              <a:t>29.10.25</a:t>
             </a:fld>
             <a:endParaRPr lang="en-DE"/>
           </a:p>
@@ -2080,7 +2085,7 @@
           <a:p>
             <a:fld id="{55825D43-8A3F-8143-9013-070E6CFB6FCE}" type="datetimeFigureOut">
               <a:rPr lang="en-DE" smtClean="0"/>
-              <a:t>23.10.25</a:t>
+              <a:t>29.10.25</a:t>
             </a:fld>
             <a:endParaRPr lang="en-DE"/>
           </a:p>
@@ -2393,7 +2398,7 @@
           <a:p>
             <a:fld id="{55825D43-8A3F-8143-9013-070E6CFB6FCE}" type="datetimeFigureOut">
               <a:rPr lang="en-DE" smtClean="0"/>
-              <a:t>23.10.25</a:t>
+              <a:t>29.10.25</a:t>
             </a:fld>
             <a:endParaRPr lang="en-DE"/>
           </a:p>
@@ -2682,7 +2687,7 @@
           <a:p>
             <a:fld id="{55825D43-8A3F-8143-9013-070E6CFB6FCE}" type="datetimeFigureOut">
               <a:rPr lang="en-DE" smtClean="0"/>
-              <a:t>23.10.25</a:t>
+              <a:t>29.10.25</a:t>
             </a:fld>
             <a:endParaRPr lang="en-DE"/>
           </a:p>
@@ -2925,7 +2930,7 @@
           <a:p>
             <a:fld id="{55825D43-8A3F-8143-9013-070E6CFB6FCE}" type="datetimeFigureOut">
               <a:rPr lang="en-DE" smtClean="0"/>
-              <a:t>23.10.25</a:t>
+              <a:t>29.10.25</a:t>
             </a:fld>
             <a:endParaRPr lang="en-DE"/>
           </a:p>
@@ -3344,10 +3349,10 @@
       </p:grpSpPr>
       <p:sp>
         <p:nvSpPr>
-          <p:cNvPr id="74" name="Rectangle 73">
-            <a:extLst>
-              <a:ext uri="{FF2B5EF4-FFF2-40B4-BE49-F238E27FC236}">
-                <a16:creationId xmlns:a16="http://schemas.microsoft.com/office/drawing/2014/main" id="{48B3CEBF-594D-3EEA-52D6-35A59121FA9D}"/>
+          <p:cNvPr id="4" name="Rectangle 3">
+            <a:extLst>
+              <a:ext uri="{FF2B5EF4-FFF2-40B4-BE49-F238E27FC236}">
+                <a16:creationId xmlns:a16="http://schemas.microsoft.com/office/drawing/2014/main" id="{6E9DE263-3F19-7345-EB55-10EC6E0A7A00}"/>
               </a:ext>
             </a:extLst>
           </p:cNvPr>
@@ -3356,17 +3361,12 @@
         </p:nvSpPr>
         <p:spPr>
           <a:xfrm>
-            <a:off x="5368412" y="1045972"/>
-            <a:ext cx="2277150" cy="865419"/>
+            <a:off x="1215267" y="2034627"/>
+            <a:ext cx="2005781" cy="927380"/>
           </a:xfrm>
           <a:prstGeom prst="rect">
             <a:avLst/>
           </a:prstGeom>
-          <a:solidFill>
-            <a:srgbClr val="ED7D31">
-              <a:alpha val="29804"/>
-            </a:srgbClr>
-          </a:solidFill>
         </p:spPr>
         <p:style>
           <a:lnRef idx="2">
@@ -3389,16 +3389,23 @@
           <a:lstStyle/>
           <a:p>
             <a:pPr algn="ctr"/>
-            <a:endParaRPr lang="en-DE"/>
-          </a:p>
-        </p:txBody>
-      </p:sp>
-      <p:sp>
-        <p:nvSpPr>
-          <p:cNvPr id="75" name="Rectangle 74">
-            <a:extLst>
-              <a:ext uri="{FF2B5EF4-FFF2-40B4-BE49-F238E27FC236}">
-                <a16:creationId xmlns:a16="http://schemas.microsoft.com/office/drawing/2014/main" id="{6B086547-2FAD-AF08-AE9E-373F06B3D729}"/>
+            <a:r>
+              <a:rPr lang="en-GB" sz="1400" dirty="0"/>
+              <a:t>1. S</a:t>
+            </a:r>
+            <a:r>
+              <a:rPr lang="en-DE" sz="1400" dirty="0"/>
+              <a:t>tart questions, including group preference (see Measures)</a:t>
+            </a:r>
+          </a:p>
+        </p:txBody>
+      </p:sp>
+      <p:sp>
+        <p:nvSpPr>
+          <p:cNvPr id="6" name="Rectangle 5">
+            <a:extLst>
+              <a:ext uri="{FF2B5EF4-FFF2-40B4-BE49-F238E27FC236}">
+                <a16:creationId xmlns:a16="http://schemas.microsoft.com/office/drawing/2014/main" id="{C592610F-67E4-38DA-3FE6-232B7C593760}"/>
               </a:ext>
             </a:extLst>
           </p:cNvPr>
@@ -3407,17 +3414,12 @@
         </p:nvSpPr>
         <p:spPr>
           <a:xfrm>
-            <a:off x="5368412" y="2007567"/>
-            <a:ext cx="2277150" cy="1685076"/>
+            <a:off x="5545394" y="973923"/>
+            <a:ext cx="1923188" cy="595835"/>
           </a:xfrm>
           <a:prstGeom prst="rect">
             <a:avLst/>
           </a:prstGeom>
-          <a:solidFill>
-            <a:srgbClr val="ED7D31">
-              <a:alpha val="29804"/>
-            </a:srgbClr>
-          </a:solidFill>
         </p:spPr>
         <p:style>
           <a:lnRef idx="2">
@@ -3440,16 +3442,19 @@
           <a:lstStyle/>
           <a:p>
             <a:pPr algn="ctr"/>
-            <a:endParaRPr lang="en-DE"/>
-          </a:p>
-        </p:txBody>
-      </p:sp>
-      <p:sp>
-        <p:nvSpPr>
-          <p:cNvPr id="76" name="Rectangle 75">
-            <a:extLst>
-              <a:ext uri="{FF2B5EF4-FFF2-40B4-BE49-F238E27FC236}">
-                <a16:creationId xmlns:a16="http://schemas.microsoft.com/office/drawing/2014/main" id="{11AFF8B6-E54A-8D63-C08B-29940225FEB4}"/>
+            <a:r>
+              <a:rPr lang="en-DE" dirty="0"/>
+              <a:t>Control</a:t>
+            </a:r>
+          </a:p>
+        </p:txBody>
+      </p:sp>
+      <p:sp>
+        <p:nvSpPr>
+          <p:cNvPr id="7" name="Rectangle 6">
+            <a:extLst>
+              <a:ext uri="{FF2B5EF4-FFF2-40B4-BE49-F238E27FC236}">
+                <a16:creationId xmlns:a16="http://schemas.microsoft.com/office/drawing/2014/main" id="{CD5C5998-6C1E-9222-607A-720F9C0A1026}"/>
               </a:ext>
             </a:extLst>
           </p:cNvPr>
@@ -3458,17 +3463,12 @@
         </p:nvSpPr>
         <p:spPr>
           <a:xfrm>
-            <a:off x="5368412" y="4107737"/>
-            <a:ext cx="2277150" cy="2018389"/>
+            <a:off x="5545393" y="2034627"/>
+            <a:ext cx="1923189" cy="318565"/>
           </a:xfrm>
           <a:prstGeom prst="rect">
             <a:avLst/>
           </a:prstGeom>
-          <a:solidFill>
-            <a:srgbClr val="ED7D31">
-              <a:alpha val="29804"/>
-            </a:srgbClr>
-          </a:solidFill>
         </p:spPr>
         <p:style>
           <a:lnRef idx="2">
@@ -3491,16 +3491,19 @@
           <a:lstStyle/>
           <a:p>
             <a:pPr algn="ctr"/>
-            <a:endParaRPr lang="en-DE"/>
-          </a:p>
-        </p:txBody>
-      </p:sp>
-      <p:sp>
-        <p:nvSpPr>
-          <p:cNvPr id="4" name="Rectangle 3">
-            <a:extLst>
-              <a:ext uri="{FF2B5EF4-FFF2-40B4-BE49-F238E27FC236}">
-                <a16:creationId xmlns:a16="http://schemas.microsoft.com/office/drawing/2014/main" id="{6E9DE263-3F19-7345-EB55-10EC6E0A7A00}"/>
+            <a:r>
+              <a:rPr lang="en-DE" dirty="0"/>
+              <a:t>Fact-checker</a:t>
+            </a:r>
+          </a:p>
+        </p:txBody>
+      </p:sp>
+      <p:sp>
+        <p:nvSpPr>
+          <p:cNvPr id="8" name="Rectangle 7">
+            <a:extLst>
+              <a:ext uri="{FF2B5EF4-FFF2-40B4-BE49-F238E27FC236}">
+                <a16:creationId xmlns:a16="http://schemas.microsoft.com/office/drawing/2014/main" id="{67D91116-AE6F-4C20-7AA6-3A642014F917}"/>
               </a:ext>
             </a:extLst>
           </p:cNvPr>
@@ -3509,8 +3512,8 @@
         </p:nvSpPr>
         <p:spPr>
           <a:xfrm>
-            <a:off x="1215267" y="2572119"/>
-            <a:ext cx="737419" cy="1740309"/>
+            <a:off x="5545393" y="2412186"/>
+            <a:ext cx="1923189" cy="318565"/>
           </a:xfrm>
           <a:prstGeom prst="rect">
             <a:avLst/>
@@ -3538,22 +3541,18 @@
           <a:p>
             <a:pPr algn="ctr"/>
             <a:r>
-              <a:rPr lang="en-GB" sz="1400" dirty="0"/>
-              <a:t>S</a:t>
-            </a:r>
-            <a:r>
-              <a:rPr lang="en-DE" sz="1400" dirty="0"/>
-              <a:t>tart questions</a:t>
-            </a:r>
-          </a:p>
-        </p:txBody>
-      </p:sp>
-      <p:sp>
-        <p:nvSpPr>
-          <p:cNvPr id="5" name="Rectangle 4">
-            <a:extLst>
-              <a:ext uri="{FF2B5EF4-FFF2-40B4-BE49-F238E27FC236}">
-                <a16:creationId xmlns:a16="http://schemas.microsoft.com/office/drawing/2014/main" id="{7E9F663C-1F1D-5BA7-4C02-0FFFD25B2698}"/>
+              <a:rPr lang="en-DE" dirty="0"/>
+              <a:t>Human-crowd</a:t>
+            </a:r>
+          </a:p>
+        </p:txBody>
+      </p:sp>
+      <p:sp>
+        <p:nvSpPr>
+          <p:cNvPr id="9" name="Rectangle 8">
+            <a:extLst>
+              <a:ext uri="{FF2B5EF4-FFF2-40B4-BE49-F238E27FC236}">
+                <a16:creationId xmlns:a16="http://schemas.microsoft.com/office/drawing/2014/main" id="{22A3C4D1-F63E-8C66-5FAF-24AA2809B497}"/>
               </a:ext>
             </a:extLst>
           </p:cNvPr>
@@ -3562,8 +3561,8 @@
         </p:nvSpPr>
         <p:spPr>
           <a:xfrm>
-            <a:off x="8362335" y="2572119"/>
-            <a:ext cx="737419" cy="1740309"/>
+            <a:off x="5545393" y="2789745"/>
+            <a:ext cx="1923189" cy="318565"/>
           </a:xfrm>
           <a:prstGeom prst="rect">
             <a:avLst/>
@@ -3591,19 +3590,18 @@
           <a:p>
             <a:pPr algn="ctr"/>
             <a:r>
-              <a:rPr lang="en-IE" sz="1400" dirty="0"/>
-              <a:t>End Questions</a:t>
-            </a:r>
-            <a:endParaRPr lang="en-DE" sz="1400" dirty="0"/>
-          </a:p>
-        </p:txBody>
-      </p:sp>
-      <p:sp>
-        <p:nvSpPr>
-          <p:cNvPr id="6" name="Rectangle 5">
-            <a:extLst>
-              <a:ext uri="{FF2B5EF4-FFF2-40B4-BE49-F238E27FC236}">
-                <a16:creationId xmlns:a16="http://schemas.microsoft.com/office/drawing/2014/main" id="{C592610F-67E4-38DA-3FE6-232B7C593760}"/>
+              <a:rPr lang="en-DE" dirty="0"/>
+              <a:t>LLM-crowd</a:t>
+            </a:r>
+          </a:p>
+        </p:txBody>
+      </p:sp>
+      <p:sp>
+        <p:nvSpPr>
+          <p:cNvPr id="10" name="Rectangle 9">
+            <a:extLst>
+              <a:ext uri="{FF2B5EF4-FFF2-40B4-BE49-F238E27FC236}">
+                <a16:creationId xmlns:a16="http://schemas.microsoft.com/office/drawing/2014/main" id="{0A2F0572-9D00-BFBE-8AD1-A8EBB07AC58C}"/>
               </a:ext>
             </a:extLst>
           </p:cNvPr>
@@ -3612,8 +3610,8 @@
         </p:nvSpPr>
         <p:spPr>
           <a:xfrm>
-            <a:off x="5545394" y="1179871"/>
-            <a:ext cx="1923188" cy="595835"/>
+            <a:off x="5545393" y="3167304"/>
+            <a:ext cx="1923189" cy="318565"/>
           </a:xfrm>
           <a:prstGeom prst="rect">
             <a:avLst/>
@@ -3642,17 +3640,17 @@
             <a:pPr algn="ctr"/>
             <a:r>
               <a:rPr lang="en-DE" dirty="0"/>
-              <a:t>Control</a:t>
-            </a:r>
-          </a:p>
-        </p:txBody>
-      </p:sp>
-      <p:sp>
-        <p:nvSpPr>
-          <p:cNvPr id="7" name="Rectangle 6">
-            <a:extLst>
-              <a:ext uri="{FF2B5EF4-FFF2-40B4-BE49-F238E27FC236}">
-                <a16:creationId xmlns:a16="http://schemas.microsoft.com/office/drawing/2014/main" id="{CD5C5998-6C1E-9222-607A-720F9C0A1026}"/>
+              <a:t>Hybrid-crowd</a:t>
+            </a:r>
+          </a:p>
+        </p:txBody>
+      </p:sp>
+      <p:sp>
+        <p:nvSpPr>
+          <p:cNvPr id="13" name="Rectangle 12">
+            <a:extLst>
+              <a:ext uri="{FF2B5EF4-FFF2-40B4-BE49-F238E27FC236}">
+                <a16:creationId xmlns:a16="http://schemas.microsoft.com/office/drawing/2014/main" id="{1519ED1A-9FAE-CA43-B0EE-5A3572139720}"/>
               </a:ext>
             </a:extLst>
           </p:cNvPr>
@@ -3661,7 +3659,7 @@
         </p:nvSpPr>
         <p:spPr>
           <a:xfrm>
-            <a:off x="5545393" y="2094271"/>
+            <a:off x="5545393" y="3947788"/>
             <a:ext cx="1923189" cy="318565"/>
           </a:xfrm>
           <a:prstGeom prst="rect">
@@ -3691,17 +3689,17 @@
             <a:pPr algn="ctr"/>
             <a:r>
               <a:rPr lang="en-DE" dirty="0"/>
-              <a:t>Fact-checker</a:t>
-            </a:r>
-          </a:p>
-        </p:txBody>
-      </p:sp>
-      <p:sp>
-        <p:nvSpPr>
-          <p:cNvPr id="8" name="Rectangle 7">
-            <a:extLst>
-              <a:ext uri="{FF2B5EF4-FFF2-40B4-BE49-F238E27FC236}">
-                <a16:creationId xmlns:a16="http://schemas.microsoft.com/office/drawing/2014/main" id="{67D91116-AE6F-4C20-7AA6-3A642014F917}"/>
+              <a:t>Human-crowd</a:t>
+            </a:r>
+          </a:p>
+        </p:txBody>
+      </p:sp>
+      <p:sp>
+        <p:nvSpPr>
+          <p:cNvPr id="14" name="Rectangle 13">
+            <a:extLst>
+              <a:ext uri="{FF2B5EF4-FFF2-40B4-BE49-F238E27FC236}">
+                <a16:creationId xmlns:a16="http://schemas.microsoft.com/office/drawing/2014/main" id="{7CE2740C-6095-4A57-5DA3-FDC9B4EC5756}"/>
               </a:ext>
             </a:extLst>
           </p:cNvPr>
@@ -3710,7 +3708,7 @@
         </p:nvSpPr>
         <p:spPr>
           <a:xfrm>
-            <a:off x="5545393" y="2471830"/>
+            <a:off x="5545393" y="4325347"/>
             <a:ext cx="1923189" cy="318565"/>
           </a:xfrm>
           <a:prstGeom prst="rect">
@@ -3740,17 +3738,17 @@
             <a:pPr algn="ctr"/>
             <a:r>
               <a:rPr lang="en-DE" dirty="0"/>
-              <a:t>Human-only</a:t>
-            </a:r>
-          </a:p>
-        </p:txBody>
-      </p:sp>
-      <p:sp>
-        <p:nvSpPr>
-          <p:cNvPr id="9" name="Rectangle 8">
-            <a:extLst>
-              <a:ext uri="{FF2B5EF4-FFF2-40B4-BE49-F238E27FC236}">
-                <a16:creationId xmlns:a16="http://schemas.microsoft.com/office/drawing/2014/main" id="{22A3C4D1-F63E-8C66-5FAF-24AA2809B497}"/>
+              <a:t>LLM-crowd</a:t>
+            </a:r>
+          </a:p>
+        </p:txBody>
+      </p:sp>
+      <p:sp>
+        <p:nvSpPr>
+          <p:cNvPr id="15" name="Rectangle 14">
+            <a:extLst>
+              <a:ext uri="{FF2B5EF4-FFF2-40B4-BE49-F238E27FC236}">
+                <a16:creationId xmlns:a16="http://schemas.microsoft.com/office/drawing/2014/main" id="{0FACD1A9-B78B-D43F-143B-AAB86127FC59}"/>
               </a:ext>
             </a:extLst>
           </p:cNvPr>
@@ -3759,7 +3757,7 @@
         </p:nvSpPr>
         <p:spPr>
           <a:xfrm>
-            <a:off x="5545393" y="2849389"/>
+            <a:off x="5545393" y="4702906"/>
             <a:ext cx="1923189" cy="318565"/>
           </a:xfrm>
           <a:prstGeom prst="rect">
@@ -3789,17 +3787,17 @@
             <a:pPr algn="ctr"/>
             <a:r>
               <a:rPr lang="en-DE" dirty="0"/>
-              <a:t>LLM-only</a:t>
-            </a:r>
-          </a:p>
-        </p:txBody>
-      </p:sp>
-      <p:sp>
-        <p:nvSpPr>
-          <p:cNvPr id="10" name="Rectangle 9">
-            <a:extLst>
-              <a:ext uri="{FF2B5EF4-FFF2-40B4-BE49-F238E27FC236}">
-                <a16:creationId xmlns:a16="http://schemas.microsoft.com/office/drawing/2014/main" id="{0A2F0572-9D00-BFBE-8AD1-A8EBB07AC58C}"/>
+              <a:t>Hybrid-crowd</a:t>
+            </a:r>
+          </a:p>
+        </p:txBody>
+      </p:sp>
+      <p:sp>
+        <p:nvSpPr>
+          <p:cNvPr id="16" name="Rectangle 15">
+            <a:extLst>
+              <a:ext uri="{FF2B5EF4-FFF2-40B4-BE49-F238E27FC236}">
+                <a16:creationId xmlns:a16="http://schemas.microsoft.com/office/drawing/2014/main" id="{43108057-BE97-647B-FB16-9A517860BCB5}"/>
               </a:ext>
             </a:extLst>
           </p:cNvPr>
@@ -3808,8 +3806,8 @@
         </p:nvSpPr>
         <p:spPr>
           <a:xfrm>
-            <a:off x="5545393" y="3226948"/>
-            <a:ext cx="1923189" cy="318565"/>
+            <a:off x="1215267" y="3009202"/>
+            <a:ext cx="1999882" cy="595835"/>
           </a:xfrm>
           <a:prstGeom prst="rect">
             <a:avLst/>
@@ -3837,18 +3835,55 @@
           <a:p>
             <a:pPr algn="ctr"/>
             <a:r>
+              <a:rPr lang="en-GB" sz="1400" dirty="0"/>
+              <a:t>2. Practice</a:t>
+            </a:r>
+            <a:endParaRPr lang="en-DE" sz="1400" dirty="0"/>
+          </a:p>
+        </p:txBody>
+      </p:sp>
+      <p:sp>
+        <p:nvSpPr>
+          <p:cNvPr id="18" name="TextBox 17">
+            <a:extLst>
+              <a:ext uri="{FF2B5EF4-FFF2-40B4-BE49-F238E27FC236}">
+                <a16:creationId xmlns:a16="http://schemas.microsoft.com/office/drawing/2014/main" id="{EDED96AB-359E-AE9E-60BC-CBE78755D168}"/>
+              </a:ext>
+            </a:extLst>
+          </p:cNvPr>
+          <p:cNvSpPr txBox="1"/>
+          <p:nvPr/>
+        </p:nvSpPr>
+        <p:spPr>
+          <a:xfrm>
+            <a:off x="5545391" y="435868"/>
+            <a:ext cx="1923189" cy="369332"/>
+          </a:xfrm>
+          <a:prstGeom prst="rect">
+            <a:avLst/>
+          </a:prstGeom>
+          <a:noFill/>
+        </p:spPr>
+        <p:txBody>
+          <a:bodyPr wrap="square" rtlCol="0">
+            <a:spAutoFit/>
+          </a:bodyPr>
+          <a:lstStyle/>
+          <a:p>
+            <a:pPr algn="ctr"/>
+            <a:r>
               <a:rPr lang="en-DE" dirty="0"/>
-              <a:t>Hybrid</a:t>
-            </a:r>
-          </a:p>
-        </p:txBody>
-      </p:sp>
-      <p:sp>
-        <p:nvSpPr>
-          <p:cNvPr id="11" name="Rectangle 10">
-            <a:extLst>
-              <a:ext uri="{FF2B5EF4-FFF2-40B4-BE49-F238E27FC236}">
-                <a16:creationId xmlns:a16="http://schemas.microsoft.com/office/drawing/2014/main" id="{6911EBAE-2913-D73A-A6B2-10FFB9D1A4E3}"/>
+              <a:t>Discernment task</a:t>
+            </a:r>
+          </a:p>
+        </p:txBody>
+      </p:sp>
+      <p:sp>
+        <p:nvSpPr>
+          <p:cNvPr id="19" name="Rectangle 18">
+            <a:extLst>
+              <a:ext uri="{FF2B5EF4-FFF2-40B4-BE49-F238E27FC236}">
+                <a16:creationId xmlns:a16="http://schemas.microsoft.com/office/drawing/2014/main" id="{A09248B7-0DDD-FC8E-8AF0-12912A58CE9E}"/>
               </a:ext>
             </a:extLst>
           </p:cNvPr>
@@ -3857,8 +3892,8 @@
         </p:nvSpPr>
         <p:spPr>
           <a:xfrm>
-            <a:off x="2029378" y="2572119"/>
-            <a:ext cx="737419" cy="1740309"/>
+            <a:off x="4459910" y="3947788"/>
+            <a:ext cx="737419" cy="1445341"/>
           </a:xfrm>
           <a:prstGeom prst="rect">
             <a:avLst/>
@@ -3887,338 +3922,6 @@
             <a:pPr algn="ctr"/>
             <a:r>
               <a:rPr lang="en-GB" sz="1400" dirty="0"/>
-              <a:t>Group Preference</a:t>
-            </a:r>
-            <a:endParaRPr lang="en-DE" sz="1400" dirty="0"/>
-          </a:p>
-        </p:txBody>
-      </p:sp>
-      <p:sp>
-        <p:nvSpPr>
-          <p:cNvPr id="12" name="Rectangle 11">
-            <a:extLst>
-              <a:ext uri="{FF2B5EF4-FFF2-40B4-BE49-F238E27FC236}">
-                <a16:creationId xmlns:a16="http://schemas.microsoft.com/office/drawing/2014/main" id="{E378C4AD-7318-CF87-F83B-885EAA05FDED}"/>
-              </a:ext>
-            </a:extLst>
-          </p:cNvPr>
-          <p:cNvSpPr/>
-          <p:nvPr/>
-        </p:nvSpPr>
-        <p:spPr>
-          <a:xfrm>
-            <a:off x="5545393" y="4200341"/>
-            <a:ext cx="1923189" cy="318565"/>
-          </a:xfrm>
-          <a:prstGeom prst="rect">
-            <a:avLst/>
-          </a:prstGeom>
-        </p:spPr>
-        <p:style>
-          <a:lnRef idx="2">
-            <a:schemeClr val="accent1">
-              <a:shade val="15000"/>
-            </a:schemeClr>
-          </a:lnRef>
-          <a:fillRef idx="1">
-            <a:schemeClr val="accent1"/>
-          </a:fillRef>
-          <a:effectRef idx="0">
-            <a:schemeClr val="accent1"/>
-          </a:effectRef>
-          <a:fontRef idx="minor">
-            <a:schemeClr val="lt1"/>
-          </a:fontRef>
-        </p:style>
-        <p:txBody>
-          <a:bodyPr rtlCol="0" anchor="ctr"/>
-          <a:lstStyle/>
-          <a:p>
-            <a:pPr algn="ctr"/>
-            <a:r>
-              <a:rPr lang="en-DE" dirty="0"/>
-              <a:t>Fact-checker</a:t>
-            </a:r>
-          </a:p>
-        </p:txBody>
-      </p:sp>
-      <p:sp>
-        <p:nvSpPr>
-          <p:cNvPr id="13" name="Rectangle 12">
-            <a:extLst>
-              <a:ext uri="{FF2B5EF4-FFF2-40B4-BE49-F238E27FC236}">
-                <a16:creationId xmlns:a16="http://schemas.microsoft.com/office/drawing/2014/main" id="{1519ED1A-9FAE-CA43-B0EE-5A3572139720}"/>
-              </a:ext>
-            </a:extLst>
-          </p:cNvPr>
-          <p:cNvSpPr/>
-          <p:nvPr/>
-        </p:nvSpPr>
-        <p:spPr>
-          <a:xfrm>
-            <a:off x="5545393" y="4577900"/>
-            <a:ext cx="1923189" cy="318565"/>
-          </a:xfrm>
-          <a:prstGeom prst="rect">
-            <a:avLst/>
-          </a:prstGeom>
-        </p:spPr>
-        <p:style>
-          <a:lnRef idx="2">
-            <a:schemeClr val="accent1">
-              <a:shade val="15000"/>
-            </a:schemeClr>
-          </a:lnRef>
-          <a:fillRef idx="1">
-            <a:schemeClr val="accent1"/>
-          </a:fillRef>
-          <a:effectRef idx="0">
-            <a:schemeClr val="accent1"/>
-          </a:effectRef>
-          <a:fontRef idx="minor">
-            <a:schemeClr val="lt1"/>
-          </a:fontRef>
-        </p:style>
-        <p:txBody>
-          <a:bodyPr rtlCol="0" anchor="ctr"/>
-          <a:lstStyle/>
-          <a:p>
-            <a:pPr algn="ctr"/>
-            <a:r>
-              <a:rPr lang="en-DE" dirty="0"/>
-              <a:t>Human-only</a:t>
-            </a:r>
-          </a:p>
-        </p:txBody>
-      </p:sp>
-      <p:sp>
-        <p:nvSpPr>
-          <p:cNvPr id="14" name="Rectangle 13">
-            <a:extLst>
-              <a:ext uri="{FF2B5EF4-FFF2-40B4-BE49-F238E27FC236}">
-                <a16:creationId xmlns:a16="http://schemas.microsoft.com/office/drawing/2014/main" id="{7CE2740C-6095-4A57-5DA3-FDC9B4EC5756}"/>
-              </a:ext>
-            </a:extLst>
-          </p:cNvPr>
-          <p:cNvSpPr/>
-          <p:nvPr/>
-        </p:nvSpPr>
-        <p:spPr>
-          <a:xfrm>
-            <a:off x="5545393" y="4955459"/>
-            <a:ext cx="1923189" cy="318565"/>
-          </a:xfrm>
-          <a:prstGeom prst="rect">
-            <a:avLst/>
-          </a:prstGeom>
-        </p:spPr>
-        <p:style>
-          <a:lnRef idx="2">
-            <a:schemeClr val="accent1">
-              <a:shade val="15000"/>
-            </a:schemeClr>
-          </a:lnRef>
-          <a:fillRef idx="1">
-            <a:schemeClr val="accent1"/>
-          </a:fillRef>
-          <a:effectRef idx="0">
-            <a:schemeClr val="accent1"/>
-          </a:effectRef>
-          <a:fontRef idx="minor">
-            <a:schemeClr val="lt1"/>
-          </a:fontRef>
-        </p:style>
-        <p:txBody>
-          <a:bodyPr rtlCol="0" anchor="ctr"/>
-          <a:lstStyle/>
-          <a:p>
-            <a:pPr algn="ctr"/>
-            <a:r>
-              <a:rPr lang="en-DE" dirty="0"/>
-              <a:t>LLM-only</a:t>
-            </a:r>
-          </a:p>
-        </p:txBody>
-      </p:sp>
-      <p:sp>
-        <p:nvSpPr>
-          <p:cNvPr id="15" name="Rectangle 14">
-            <a:extLst>
-              <a:ext uri="{FF2B5EF4-FFF2-40B4-BE49-F238E27FC236}">
-                <a16:creationId xmlns:a16="http://schemas.microsoft.com/office/drawing/2014/main" id="{0FACD1A9-B78B-D43F-143B-AAB86127FC59}"/>
-              </a:ext>
-            </a:extLst>
-          </p:cNvPr>
-          <p:cNvSpPr/>
-          <p:nvPr/>
-        </p:nvSpPr>
-        <p:spPr>
-          <a:xfrm>
-            <a:off x="5545393" y="5333018"/>
-            <a:ext cx="1923189" cy="318565"/>
-          </a:xfrm>
-          <a:prstGeom prst="rect">
-            <a:avLst/>
-          </a:prstGeom>
-        </p:spPr>
-        <p:style>
-          <a:lnRef idx="2">
-            <a:schemeClr val="accent1">
-              <a:shade val="15000"/>
-            </a:schemeClr>
-          </a:lnRef>
-          <a:fillRef idx="1">
-            <a:schemeClr val="accent1"/>
-          </a:fillRef>
-          <a:effectRef idx="0">
-            <a:schemeClr val="accent1"/>
-          </a:effectRef>
-          <a:fontRef idx="minor">
-            <a:schemeClr val="lt1"/>
-          </a:fontRef>
-        </p:style>
-        <p:txBody>
-          <a:bodyPr rtlCol="0" anchor="ctr"/>
-          <a:lstStyle/>
-          <a:p>
-            <a:pPr algn="ctr"/>
-            <a:r>
-              <a:rPr lang="en-DE" dirty="0"/>
-              <a:t>Hybrid</a:t>
-            </a:r>
-          </a:p>
-        </p:txBody>
-      </p:sp>
-      <p:sp>
-        <p:nvSpPr>
-          <p:cNvPr id="16" name="Rectangle 15">
-            <a:extLst>
-              <a:ext uri="{FF2B5EF4-FFF2-40B4-BE49-F238E27FC236}">
-                <a16:creationId xmlns:a16="http://schemas.microsoft.com/office/drawing/2014/main" id="{43108057-BE97-647B-FB16-9A517860BCB5}"/>
-              </a:ext>
-            </a:extLst>
-          </p:cNvPr>
-          <p:cNvSpPr/>
-          <p:nvPr/>
-        </p:nvSpPr>
-        <p:spPr>
-          <a:xfrm>
-            <a:off x="2849388" y="2572119"/>
-            <a:ext cx="737419" cy="1740309"/>
-          </a:xfrm>
-          <a:prstGeom prst="rect">
-            <a:avLst/>
-          </a:prstGeom>
-        </p:spPr>
-        <p:style>
-          <a:lnRef idx="2">
-            <a:schemeClr val="accent1">
-              <a:shade val="15000"/>
-            </a:schemeClr>
-          </a:lnRef>
-          <a:fillRef idx="1">
-            <a:schemeClr val="accent1"/>
-          </a:fillRef>
-          <a:effectRef idx="0">
-            <a:schemeClr val="accent1"/>
-          </a:effectRef>
-          <a:fontRef idx="minor">
-            <a:schemeClr val="lt1"/>
-          </a:fontRef>
-        </p:style>
-        <p:txBody>
-          <a:bodyPr rtlCol="0" anchor="ctr"/>
-          <a:lstStyle/>
-          <a:p>
-            <a:pPr algn="ctr"/>
-            <a:r>
-              <a:rPr lang="en-GB" sz="1400" dirty="0"/>
-              <a:t>Practice</a:t>
-            </a:r>
-            <a:endParaRPr lang="en-DE" sz="1400" dirty="0"/>
-          </a:p>
-        </p:txBody>
-      </p:sp>
-      <p:sp>
-        <p:nvSpPr>
-          <p:cNvPr id="18" name="TextBox 17">
-            <a:extLst>
-              <a:ext uri="{FF2B5EF4-FFF2-40B4-BE49-F238E27FC236}">
-                <a16:creationId xmlns:a16="http://schemas.microsoft.com/office/drawing/2014/main" id="{EDED96AB-359E-AE9E-60BC-CBE78755D168}"/>
-              </a:ext>
-            </a:extLst>
-          </p:cNvPr>
-          <p:cNvSpPr txBox="1"/>
-          <p:nvPr/>
-        </p:nvSpPr>
-        <p:spPr>
-          <a:xfrm>
-            <a:off x="5368412" y="546232"/>
-            <a:ext cx="2277150" cy="369332"/>
-          </a:xfrm>
-          <a:prstGeom prst="rect">
-            <a:avLst/>
-          </a:prstGeom>
-          <a:noFill/>
-        </p:spPr>
-        <p:txBody>
-          <a:bodyPr wrap="square" rtlCol="0">
-            <a:spAutoFit/>
-          </a:bodyPr>
-          <a:lstStyle/>
-          <a:p>
-            <a:pPr algn="ctr"/>
-            <a:r>
-              <a:rPr lang="en-DE" dirty="0"/>
-              <a:t>Discernment task</a:t>
-            </a:r>
-          </a:p>
-        </p:txBody>
-      </p:sp>
-      <p:sp>
-        <p:nvSpPr>
-          <p:cNvPr id="19" name="Rectangle 18">
-            <a:extLst>
-              <a:ext uri="{FF2B5EF4-FFF2-40B4-BE49-F238E27FC236}">
-                <a16:creationId xmlns:a16="http://schemas.microsoft.com/office/drawing/2014/main" id="{A09248B7-0DDD-FC8E-8AF0-12912A58CE9E}"/>
-              </a:ext>
-            </a:extLst>
-          </p:cNvPr>
-          <p:cNvSpPr/>
-          <p:nvPr/>
-        </p:nvSpPr>
-        <p:spPr>
-          <a:xfrm>
-            <a:off x="4400919" y="4200341"/>
-            <a:ext cx="737419" cy="1451242"/>
-          </a:xfrm>
-          <a:prstGeom prst="rect">
-            <a:avLst/>
-          </a:prstGeom>
-        </p:spPr>
-        <p:style>
-          <a:lnRef idx="2">
-            <a:schemeClr val="accent1">
-              <a:shade val="15000"/>
-            </a:schemeClr>
-          </a:lnRef>
-          <a:fillRef idx="1">
-            <a:schemeClr val="accent1"/>
-          </a:fillRef>
-          <a:effectRef idx="0">
-            <a:schemeClr val="accent1"/>
-          </a:effectRef>
-          <a:fontRef idx="minor">
-            <a:schemeClr val="lt1"/>
-          </a:fontRef>
-        </p:style>
-        <p:txBody>
-          <a:bodyPr rtlCol="0" anchor="ctr"/>
-          <a:lstStyle/>
-          <a:p>
-            <a:pPr algn="ctr"/>
-            <a:r>
-              <a:rPr lang="en-GB" sz="1400" dirty="0"/>
               <a:t>Advisor self-select</a:t>
             </a:r>
             <a:endParaRPr lang="en-DE" sz="1400" dirty="0"/>
@@ -4235,6 +3938,7 @@
             </a:extLst>
           </p:cNvPr>
           <p:cNvCxnSpPr>
+            <a:cxnSpLocks/>
             <a:stCxn id="16" idx="3"/>
             <a:endCxn id="6" idx="1"/>
           </p:cNvCxnSpPr>
@@ -4242,8 +3946,8 @@
         </p:nvCxnSpPr>
         <p:spPr>
           <a:xfrm flipV="1">
-            <a:off x="3586807" y="1477789"/>
-            <a:ext cx="1958587" cy="1964485"/>
+            <a:off x="3215149" y="1271841"/>
+            <a:ext cx="2330245" cy="2035279"/>
           </a:xfrm>
           <a:prstGeom prst="straightConnector1">
             <a:avLst/>
@@ -4285,8 +3989,8 @@
         </p:nvCxnSpPr>
         <p:spPr>
           <a:xfrm flipV="1">
-            <a:off x="3586807" y="2253554"/>
-            <a:ext cx="1958586" cy="1188720"/>
+            <a:off x="3215149" y="2193910"/>
+            <a:ext cx="2330244" cy="1113210"/>
           </a:xfrm>
           <a:prstGeom prst="straightConnector1">
             <a:avLst/>
@@ -4328,8 +4032,8 @@
         </p:nvCxnSpPr>
         <p:spPr>
           <a:xfrm flipV="1">
-            <a:off x="3586807" y="2631113"/>
-            <a:ext cx="1958586" cy="811161"/>
+            <a:off x="3215149" y="2571469"/>
+            <a:ext cx="2330244" cy="735651"/>
           </a:xfrm>
           <a:prstGeom prst="straightConnector1">
             <a:avLst/>
@@ -4371,8 +4075,8 @@
         </p:nvCxnSpPr>
         <p:spPr>
           <a:xfrm flipV="1">
-            <a:off x="3586807" y="3008672"/>
-            <a:ext cx="1958586" cy="433602"/>
+            <a:off x="3215149" y="2949028"/>
+            <a:ext cx="2330244" cy="358092"/>
           </a:xfrm>
           <a:prstGeom prst="straightConnector1">
             <a:avLst/>
@@ -4413,9 +4117,9 @@
           <p:nvPr/>
         </p:nvCxnSpPr>
         <p:spPr>
-          <a:xfrm flipV="1">
-            <a:off x="3586807" y="3386231"/>
-            <a:ext cx="1958586" cy="56043"/>
+          <a:xfrm>
+            <a:off x="3215149" y="3307120"/>
+            <a:ext cx="2330244" cy="19467"/>
           </a:xfrm>
           <a:prstGeom prst="straightConnector1">
             <a:avLst/>
@@ -4449,6 +4153,7 @@
             </a:extLst>
           </p:cNvPr>
           <p:cNvCxnSpPr>
+            <a:cxnSpLocks/>
             <a:stCxn id="6" idx="3"/>
             <a:endCxn id="5" idx="1"/>
           </p:cNvCxnSpPr>
@@ -4456,8 +4161,8 @@
         </p:nvCxnSpPr>
         <p:spPr>
           <a:xfrm>
-            <a:off x="7468582" y="1477789"/>
-            <a:ext cx="893753" cy="1964485"/>
+            <a:off x="7468582" y="1271841"/>
+            <a:ext cx="837708" cy="1560967"/>
           </a:xfrm>
           <a:prstGeom prst="straightConnector1">
             <a:avLst/>
@@ -4499,8 +4204,8 @@
         </p:nvCxnSpPr>
         <p:spPr>
           <a:xfrm>
-            <a:off x="7468582" y="2253554"/>
-            <a:ext cx="893753" cy="1188720"/>
+            <a:off x="7468582" y="2193910"/>
+            <a:ext cx="837708" cy="638898"/>
           </a:xfrm>
           <a:prstGeom prst="straightConnector1">
             <a:avLst/>
@@ -4542,8 +4247,8 @@
         </p:nvCxnSpPr>
         <p:spPr>
           <a:xfrm>
-            <a:off x="7468582" y="2631113"/>
-            <a:ext cx="893753" cy="811161"/>
+            <a:off x="7468582" y="2571469"/>
+            <a:ext cx="837708" cy="261339"/>
           </a:xfrm>
           <a:prstGeom prst="straightConnector1">
             <a:avLst/>
@@ -4584,9 +4289,9 @@
           <p:nvPr/>
         </p:nvCxnSpPr>
         <p:spPr>
-          <a:xfrm>
-            <a:off x="7468582" y="3008672"/>
-            <a:ext cx="893753" cy="433602"/>
+          <a:xfrm flipV="1">
+            <a:off x="7468582" y="2832808"/>
+            <a:ext cx="837708" cy="116220"/>
           </a:xfrm>
           <a:prstGeom prst="straightConnector1">
             <a:avLst/>
@@ -4627,9 +4332,9 @@
           <p:nvPr/>
         </p:nvCxnSpPr>
         <p:spPr>
-          <a:xfrm>
-            <a:off x="7468582" y="3386231"/>
-            <a:ext cx="893753" cy="56043"/>
+          <a:xfrm flipV="1">
+            <a:off x="7468582" y="2832808"/>
+            <a:ext cx="837708" cy="493779"/>
           </a:xfrm>
           <a:prstGeom prst="straightConnector1">
             <a:avLst/>
@@ -4671,8 +4376,8 @@
         </p:nvCxnSpPr>
         <p:spPr>
           <a:xfrm>
-            <a:off x="3586807" y="3442274"/>
-            <a:ext cx="814112" cy="1483688"/>
+            <a:off x="3215149" y="3307120"/>
+            <a:ext cx="1244761" cy="1363339"/>
           </a:xfrm>
           <a:prstGeom prst="straightConnector1">
             <a:avLst/>
@@ -4690,54 +4395,6 @@
           </a:fillRef>
           <a:effectRef idx="0">
             <a:schemeClr val="accent1"/>
-          </a:effectRef>
-          <a:fontRef idx="minor">
-            <a:schemeClr val="tx1"/>
-          </a:fontRef>
-        </p:style>
-      </p:cxnSp>
-      <p:cxnSp>
-        <p:nvCxnSpPr>
-          <p:cNvPr id="52" name="Straight Arrow Connector 51">
-            <a:extLst>
-              <a:ext uri="{FF2B5EF4-FFF2-40B4-BE49-F238E27FC236}">
-                <a16:creationId xmlns:a16="http://schemas.microsoft.com/office/drawing/2014/main" id="{ABF00E9A-C585-A382-87F2-3F7D8818C767}"/>
-              </a:ext>
-            </a:extLst>
-          </p:cNvPr>
-          <p:cNvCxnSpPr>
-            <a:stCxn id="19" idx="3"/>
-            <a:endCxn id="12" idx="1"/>
-          </p:cNvCxnSpPr>
-          <p:nvPr/>
-        </p:nvCxnSpPr>
-        <p:spPr>
-          <a:xfrm flipV="1">
-            <a:off x="5138338" y="4359624"/>
-            <a:ext cx="407055" cy="566338"/>
-          </a:xfrm>
-          <a:prstGeom prst="straightConnector1">
-            <a:avLst/>
-          </a:prstGeom>
-          <a:ln w="9525" cap="flat" cmpd="sng" algn="ctr">
-            <a:solidFill>
-              <a:schemeClr val="accent5"/>
-            </a:solidFill>
-            <a:prstDash val="dash"/>
-            <a:round/>
-            <a:headEnd type="none" w="med" len="med"/>
-            <a:tailEnd type="none" w="med" len="med"/>
-          </a:ln>
-        </p:spPr>
-        <p:style>
-          <a:lnRef idx="0">
-            <a:scrgbClr r="0" g="0" b="0"/>
-          </a:lnRef>
-          <a:fillRef idx="0">
-            <a:scrgbClr r="0" g="0" b="0"/>
-          </a:fillRef>
-          <a:effectRef idx="0">
-            <a:scrgbClr r="0" g="0" b="0"/>
           </a:effectRef>
           <a:fontRef idx="minor">
             <a:schemeClr val="tx1"/>
@@ -4756,13 +4413,14 @@
           <p:cNvCxnSpPr>
             <a:cxnSpLocks/>
             <a:stCxn id="19" idx="3"/>
+            <a:endCxn id="13" idx="1"/>
           </p:cNvCxnSpPr>
           <p:nvPr/>
         </p:nvCxnSpPr>
         <p:spPr>
           <a:xfrm flipV="1">
-            <a:off x="5138338" y="4725384"/>
-            <a:ext cx="412954" cy="200578"/>
+            <a:off x="5197329" y="4107071"/>
+            <a:ext cx="348064" cy="563388"/>
           </a:xfrm>
           <a:prstGeom prst="straightConnector1">
             <a:avLst/>
@@ -4804,13 +4462,14 @@
           <p:cNvCxnSpPr>
             <a:cxnSpLocks/>
             <a:stCxn id="19" idx="3"/>
+            <a:endCxn id="14" idx="1"/>
           </p:cNvCxnSpPr>
           <p:nvPr/>
         </p:nvCxnSpPr>
         <p:spPr>
-          <a:xfrm>
-            <a:off x="5138338" y="4925962"/>
-            <a:ext cx="412954" cy="182880"/>
+          <a:xfrm flipV="1">
+            <a:off x="5197329" y="4484630"/>
+            <a:ext cx="348064" cy="185829"/>
           </a:xfrm>
           <a:prstGeom prst="straightConnector1">
             <a:avLst/>
@@ -4852,13 +4511,14 @@
           <p:cNvCxnSpPr>
             <a:cxnSpLocks/>
             <a:stCxn id="19" idx="3"/>
+            <a:endCxn id="15" idx="1"/>
           </p:cNvCxnSpPr>
           <p:nvPr/>
         </p:nvCxnSpPr>
         <p:spPr>
           <a:xfrm>
-            <a:off x="5138338" y="4925962"/>
-            <a:ext cx="412954" cy="572237"/>
+            <a:off x="5197329" y="4670459"/>
+            <a:ext cx="348064" cy="191730"/>
           </a:xfrm>
           <a:prstGeom prst="straightConnector1">
             <a:avLst/>
@@ -4890,23 +4550,23 @@
       </p:cxnSp>
       <p:cxnSp>
         <p:nvCxnSpPr>
-          <p:cNvPr id="59" name="Straight Arrow Connector 58">
-            <a:extLst>
-              <a:ext uri="{FF2B5EF4-FFF2-40B4-BE49-F238E27FC236}">
-                <a16:creationId xmlns:a16="http://schemas.microsoft.com/office/drawing/2014/main" id="{7F704826-0399-9102-517F-BDFA2D2FD3E7}"/>
+          <p:cNvPr id="63" name="Straight Arrow Connector 62">
+            <a:extLst>
+              <a:ext uri="{FF2B5EF4-FFF2-40B4-BE49-F238E27FC236}">
+                <a16:creationId xmlns:a16="http://schemas.microsoft.com/office/drawing/2014/main" id="{58DDC65B-99A0-0027-7FDD-FD5F2C418470}"/>
               </a:ext>
             </a:extLst>
           </p:cNvPr>
           <p:cNvCxnSpPr>
             <a:cxnSpLocks/>
-            <a:stCxn id="12" idx="3"/>
+            <a:stCxn id="14" idx="3"/>
           </p:cNvCxnSpPr>
           <p:nvPr/>
         </p:nvCxnSpPr>
         <p:spPr>
           <a:xfrm flipV="1">
-            <a:off x="7468582" y="3412777"/>
-            <a:ext cx="893753" cy="946847"/>
+            <a:off x="7468582" y="2835355"/>
+            <a:ext cx="837709" cy="1649275"/>
           </a:xfrm>
           <a:prstGeom prst="straightConnector1">
             <a:avLst/>
@@ -4930,132 +4590,6 @@
           </a:fontRef>
         </p:style>
       </p:cxnSp>
-      <p:cxnSp>
-        <p:nvCxnSpPr>
-          <p:cNvPr id="61" name="Straight Arrow Connector 60">
-            <a:extLst>
-              <a:ext uri="{FF2B5EF4-FFF2-40B4-BE49-F238E27FC236}">
-                <a16:creationId xmlns:a16="http://schemas.microsoft.com/office/drawing/2014/main" id="{40C663B3-C5AF-7707-5B48-BC42DEB758C4}"/>
-              </a:ext>
-            </a:extLst>
-          </p:cNvPr>
-          <p:cNvCxnSpPr>
-            <a:cxnSpLocks/>
-            <a:endCxn id="5" idx="1"/>
-          </p:cNvCxnSpPr>
-          <p:nvPr/>
-        </p:nvCxnSpPr>
-        <p:spPr>
-          <a:xfrm flipV="1">
-            <a:off x="7474481" y="3442274"/>
-            <a:ext cx="887854" cy="1306708"/>
-          </a:xfrm>
-          <a:prstGeom prst="straightConnector1">
-            <a:avLst/>
-          </a:prstGeom>
-          <a:ln>
-            <a:tailEnd type="triangle"/>
-          </a:ln>
-        </p:spPr>
-        <p:style>
-          <a:lnRef idx="1">
-            <a:schemeClr val="accent1"/>
-          </a:lnRef>
-          <a:fillRef idx="0">
-            <a:schemeClr val="accent1"/>
-          </a:fillRef>
-          <a:effectRef idx="0">
-            <a:schemeClr val="accent1"/>
-          </a:effectRef>
-          <a:fontRef idx="minor">
-            <a:schemeClr val="tx1"/>
-          </a:fontRef>
-        </p:style>
-      </p:cxnSp>
-      <p:cxnSp>
-        <p:nvCxnSpPr>
-          <p:cNvPr id="62" name="Straight Arrow Connector 61">
-            <a:extLst>
-              <a:ext uri="{FF2B5EF4-FFF2-40B4-BE49-F238E27FC236}">
-                <a16:creationId xmlns:a16="http://schemas.microsoft.com/office/drawing/2014/main" id="{81B42807-418D-88B6-CBCE-02C3768370D5}"/>
-              </a:ext>
-            </a:extLst>
-          </p:cNvPr>
-          <p:cNvCxnSpPr>
-            <a:cxnSpLocks/>
-            <a:endCxn id="5" idx="1"/>
-          </p:cNvCxnSpPr>
-          <p:nvPr/>
-        </p:nvCxnSpPr>
-        <p:spPr>
-          <a:xfrm flipV="1">
-            <a:off x="7468582" y="3442274"/>
-            <a:ext cx="893753" cy="1672468"/>
-          </a:xfrm>
-          <a:prstGeom prst="straightConnector1">
-            <a:avLst/>
-          </a:prstGeom>
-          <a:ln>
-            <a:tailEnd type="triangle"/>
-          </a:ln>
-        </p:spPr>
-        <p:style>
-          <a:lnRef idx="1">
-            <a:schemeClr val="accent1"/>
-          </a:lnRef>
-          <a:fillRef idx="0">
-            <a:schemeClr val="accent1"/>
-          </a:fillRef>
-          <a:effectRef idx="0">
-            <a:schemeClr val="accent1"/>
-          </a:effectRef>
-          <a:fontRef idx="minor">
-            <a:schemeClr val="tx1"/>
-          </a:fontRef>
-        </p:style>
-      </p:cxnSp>
-      <p:cxnSp>
-        <p:nvCxnSpPr>
-          <p:cNvPr id="63" name="Straight Arrow Connector 62">
-            <a:extLst>
-              <a:ext uri="{FF2B5EF4-FFF2-40B4-BE49-F238E27FC236}">
-                <a16:creationId xmlns:a16="http://schemas.microsoft.com/office/drawing/2014/main" id="{58DDC65B-99A0-0027-7FDD-FD5F2C418470}"/>
-              </a:ext>
-            </a:extLst>
-          </p:cNvPr>
-          <p:cNvCxnSpPr>
-            <a:cxnSpLocks/>
-            <a:endCxn id="5" idx="1"/>
-          </p:cNvCxnSpPr>
-          <p:nvPr/>
-        </p:nvCxnSpPr>
-        <p:spPr>
-          <a:xfrm flipV="1">
-            <a:off x="7468582" y="3442274"/>
-            <a:ext cx="893753" cy="2061825"/>
-          </a:xfrm>
-          <a:prstGeom prst="straightConnector1">
-            <a:avLst/>
-          </a:prstGeom>
-          <a:ln>
-            <a:tailEnd type="triangle"/>
-          </a:ln>
-        </p:spPr>
-        <p:style>
-          <a:lnRef idx="1">
-            <a:schemeClr val="accent1"/>
-          </a:lnRef>
-          <a:fillRef idx="0">
-            <a:schemeClr val="accent1"/>
-          </a:fillRef>
-          <a:effectRef idx="0">
-            <a:schemeClr val="accent1"/>
-          </a:effectRef>
-          <a:fontRef idx="minor">
-            <a:schemeClr val="tx1"/>
-          </a:fontRef>
-        </p:style>
-      </p:cxnSp>
       <p:sp>
         <p:nvSpPr>
           <p:cNvPr id="67" name="TextBox 66">
@@ -5070,7 +4604,7 @@
         </p:nvSpPr>
         <p:spPr>
           <a:xfrm>
-            <a:off x="3669399" y="2003185"/>
+            <a:off x="3501268" y="1847230"/>
             <a:ext cx="2277150" cy="369332"/>
           </a:xfrm>
           <a:prstGeom prst="rect">
@@ -5106,7 +4640,7 @@
         </p:nvSpPr>
         <p:spPr>
           <a:xfrm>
-            <a:off x="5545393" y="5704677"/>
+            <a:off x="5545393" y="5074565"/>
             <a:ext cx="1923189" cy="318565"/>
           </a:xfrm>
           <a:prstGeom prst="rect">
@@ -5153,13 +4687,14 @@
           <p:cNvCxnSpPr>
             <a:cxnSpLocks/>
             <a:stCxn id="19" idx="3"/>
+            <a:endCxn id="68" idx="1"/>
           </p:cNvCxnSpPr>
           <p:nvPr/>
         </p:nvCxnSpPr>
         <p:spPr>
           <a:xfrm>
-            <a:off x="5138338" y="4925962"/>
-            <a:ext cx="412954" cy="943896"/>
+            <a:off x="5197329" y="4670459"/>
+            <a:ext cx="348064" cy="563389"/>
           </a:xfrm>
           <a:prstGeom prst="straightConnector1">
             <a:avLst/>
@@ -5200,14 +4735,15 @@
           </p:cNvPr>
           <p:cNvCxnSpPr>
             <a:cxnSpLocks/>
+            <a:stCxn id="68" idx="3"/>
             <a:endCxn id="5" idx="1"/>
           </p:cNvCxnSpPr>
           <p:nvPr/>
         </p:nvCxnSpPr>
         <p:spPr>
           <a:xfrm flipV="1">
-            <a:off x="7468582" y="3442274"/>
-            <a:ext cx="893753" cy="2433484"/>
+            <a:off x="7468582" y="2832808"/>
+            <a:ext cx="837708" cy="2401040"/>
           </a:xfrm>
           <a:prstGeom prst="straightConnector1">
             <a:avLst/>
@@ -5245,7 +4781,7 @@
         </p:nvSpPr>
         <p:spPr>
           <a:xfrm>
-            <a:off x="5341865" y="6126127"/>
+            <a:off x="5341865" y="5496015"/>
             <a:ext cx="2277150" cy="646331"/>
           </a:xfrm>
           <a:prstGeom prst="rect">
@@ -5281,7 +4817,7 @@
         </p:nvSpPr>
         <p:spPr>
           <a:xfrm>
-            <a:off x="3634003" y="2882647"/>
+            <a:off x="3545512" y="2659074"/>
             <a:ext cx="2277150" cy="646331"/>
           </a:xfrm>
           <a:prstGeom prst="rect">
@@ -5324,7 +4860,7 @@
         </p:nvSpPr>
         <p:spPr>
           <a:xfrm>
-            <a:off x="2855288" y="4021710"/>
+            <a:off x="2698954" y="3832516"/>
             <a:ext cx="2277150" cy="646331"/>
           </a:xfrm>
           <a:prstGeom prst="rect">
@@ -5350,6 +4886,141 @@
               <a:rPr lang="en-DE" i="1" dirty="0"/>
               <a:t>select</a:t>
             </a:r>
+          </a:p>
+        </p:txBody>
+      </p:sp>
+      <p:cxnSp>
+        <p:nvCxnSpPr>
+          <p:cNvPr id="61" name="Straight Arrow Connector 60">
+            <a:extLst>
+              <a:ext uri="{FF2B5EF4-FFF2-40B4-BE49-F238E27FC236}">
+                <a16:creationId xmlns:a16="http://schemas.microsoft.com/office/drawing/2014/main" id="{40C663B3-C5AF-7707-5B48-BC42DEB758C4}"/>
+              </a:ext>
+            </a:extLst>
+          </p:cNvPr>
+          <p:cNvCxnSpPr>
+            <a:cxnSpLocks/>
+            <a:stCxn id="13" idx="3"/>
+            <a:endCxn id="5" idx="1"/>
+          </p:cNvCxnSpPr>
+          <p:nvPr/>
+        </p:nvCxnSpPr>
+        <p:spPr>
+          <a:xfrm flipV="1">
+            <a:off x="7468582" y="2832808"/>
+            <a:ext cx="837708" cy="1274263"/>
+          </a:xfrm>
+          <a:prstGeom prst="straightConnector1">
+            <a:avLst/>
+          </a:prstGeom>
+          <a:ln>
+            <a:tailEnd type="triangle"/>
+          </a:ln>
+        </p:spPr>
+        <p:style>
+          <a:lnRef idx="1">
+            <a:schemeClr val="accent1"/>
+          </a:lnRef>
+          <a:fillRef idx="0">
+            <a:schemeClr val="accent1"/>
+          </a:fillRef>
+          <a:effectRef idx="0">
+            <a:schemeClr val="accent1"/>
+          </a:effectRef>
+          <a:fontRef idx="minor">
+            <a:schemeClr val="tx1"/>
+          </a:fontRef>
+        </p:style>
+      </p:cxnSp>
+      <p:cxnSp>
+        <p:nvCxnSpPr>
+          <p:cNvPr id="153" name="Straight Arrow Connector 152">
+            <a:extLst>
+              <a:ext uri="{FF2B5EF4-FFF2-40B4-BE49-F238E27FC236}">
+                <a16:creationId xmlns:a16="http://schemas.microsoft.com/office/drawing/2014/main" id="{008EE8CA-D1EF-E81E-8B84-1BBE745B3013}"/>
+              </a:ext>
+            </a:extLst>
+          </p:cNvPr>
+          <p:cNvCxnSpPr>
+            <a:cxnSpLocks/>
+            <a:endCxn id="5" idx="1"/>
+          </p:cNvCxnSpPr>
+          <p:nvPr/>
+        </p:nvCxnSpPr>
+        <p:spPr>
+          <a:xfrm flipV="1">
+            <a:off x="7468581" y="2832808"/>
+            <a:ext cx="837709" cy="2073034"/>
+          </a:xfrm>
+          <a:prstGeom prst="straightConnector1">
+            <a:avLst/>
+          </a:prstGeom>
+          <a:ln>
+            <a:tailEnd type="triangle"/>
+          </a:ln>
+        </p:spPr>
+        <p:style>
+          <a:lnRef idx="1">
+            <a:schemeClr val="accent1"/>
+          </a:lnRef>
+          <a:fillRef idx="0">
+            <a:schemeClr val="accent1"/>
+          </a:fillRef>
+          <a:effectRef idx="0">
+            <a:schemeClr val="accent1"/>
+          </a:effectRef>
+          <a:fontRef idx="minor">
+            <a:schemeClr val="tx1"/>
+          </a:fontRef>
+        </p:style>
+      </p:cxnSp>
+      <p:sp>
+        <p:nvSpPr>
+          <p:cNvPr id="5" name="Rectangle 4">
+            <a:extLst>
+              <a:ext uri="{FF2B5EF4-FFF2-40B4-BE49-F238E27FC236}">
+                <a16:creationId xmlns:a16="http://schemas.microsoft.com/office/drawing/2014/main" id="{7E9F663C-1F1D-5BA7-4C02-0FFFD25B2698}"/>
+              </a:ext>
+            </a:extLst>
+          </p:cNvPr>
+          <p:cNvSpPr/>
+          <p:nvPr/>
+        </p:nvSpPr>
+        <p:spPr>
+          <a:xfrm>
+            <a:off x="8306290" y="2537438"/>
+            <a:ext cx="1999881" cy="590739"/>
+          </a:xfrm>
+          <a:prstGeom prst="rect">
+            <a:avLst/>
+          </a:prstGeom>
+        </p:spPr>
+        <p:style>
+          <a:lnRef idx="2">
+            <a:schemeClr val="accent1">
+              <a:shade val="15000"/>
+            </a:schemeClr>
+          </a:lnRef>
+          <a:fillRef idx="1">
+            <a:schemeClr val="accent1"/>
+          </a:fillRef>
+          <a:effectRef idx="0">
+            <a:schemeClr val="accent1"/>
+          </a:effectRef>
+          <a:fontRef idx="minor">
+            <a:schemeClr val="lt1"/>
+          </a:fontRef>
+        </p:style>
+        <p:txBody>
+          <a:bodyPr rtlCol="0" anchor="ctr"/>
+          <a:lstStyle/>
+          <a:p>
+            <a:pPr algn="ctr"/>
+            <a:r>
+              <a:rPr lang="en-IE" sz="1400" dirty="0"/>
+              <a:t>End Questions</a:t>
+            </a:r>
+            <a:endParaRPr lang="en-DE" sz="1400" dirty="0"/>
           </a:p>
         </p:txBody>
       </p:sp>

</xml_diff>